<commit_message>
Adiciona plano de fundo e coluna 'ano' em dffull.csv
</commit_message>
<xml_diff>
--- a/Plano de Fundo.pptx
+++ b/Plano de Fundo.pptx
@@ -8,7 +8,7 @@
     <p:sldId id="256" r:id="rId3"/>
   </p:sldIdLst>
   <p:sldSz cx="12192000" cy="6858000"/>
-  <p:notesSz cx="6858000" cy="9144000"/>
+  <p:notesSz cx="7559675" cy="10691813"/>
 </p:presentation>
 </file>
 
@@ -41,8 +41,8 @@
         </p:nvSpPr>
         <p:spPr>
           <a:xfrm>
-            <a:off x="1523880" y="1122480"/>
-            <a:ext cx="9143640" cy="2387160"/>
+            <a:off x="1523880" y="2002680"/>
+            <a:ext cx="9142920" cy="625320"/>
           </a:xfrm>
           <a:prstGeom prst="rect">
             <a:avLst/>
@@ -57,10 +57,10 @@
             <a:spAutoFit/>
           </a:bodyPr>
           <a:p>
-            <a:pPr indent="0">
+            <a:pPr indent="0" algn="ctr">
               <a:buNone/>
             </a:pPr>
-            <a:endParaRPr b="0" lang="pt-BR" sz="1400" strike="noStrike" u="none">
+            <a:endParaRPr b="0" lang="pt-BR" sz="4400" strike="noStrike" u="none">
               <a:solidFill>
                 <a:srgbClr val="000000"/>
               </a:solidFill>
@@ -154,8 +154,8 @@
         </p:nvSpPr>
         <p:spPr>
           <a:xfrm>
-            <a:off x="1523880" y="1122480"/>
-            <a:ext cx="9143640" cy="2387160"/>
+            <a:off x="1523880" y="2178000"/>
+            <a:ext cx="9142920" cy="274680"/>
           </a:xfrm>
           <a:prstGeom prst="rect">
             <a:avLst/>
@@ -166,15 +166,15 @@
           </a:ln>
         </p:spPr>
         <p:txBody>
-          <a:bodyPr lIns="91440" rIns="91440" tIns="45720" bIns="45720" anchor="b">
-            <a:noAutofit/>
+          <a:bodyPr lIns="0" rIns="0" tIns="0" bIns="0" anchor="ctr">
+            <a:spAutoFit/>
           </a:bodyPr>
           <a:p>
             <a:pPr indent="0">
               <a:buNone/>
             </a:pPr>
             <a:r>
-              <a:rPr b="0" lang="pt-BR" sz="6000" strike="noStrike" u="none">
+              <a:rPr b="0" lang="pt-BR" sz="1800" strike="noStrike" u="none">
                 <a:solidFill>
                   <a:srgbClr val="000000"/>
                 </a:solidFill>
@@ -184,7 +184,7 @@
               </a:rPr>
               <a:t>Clique para editar o formato do texto do título</a:t>
             </a:r>
-            <a:endParaRPr b="0" lang="pt-BR" sz="6000" strike="noStrike" u="none">
+            <a:endParaRPr b="0" lang="pt-BR" sz="1800" strike="noStrike" u="none">
               <a:solidFill>
                 <a:srgbClr val="000000"/>
               </a:solidFill>
@@ -235,7 +235,7 @@
               <a:buChar char=""/>
             </a:pPr>
             <a:r>
-              <a:rPr b="0" lang="pt-BR" sz="1400" strike="noStrike" u="none">
+              <a:rPr b="0" lang="pt-BR" sz="3200" strike="noStrike" u="none">
                 <a:solidFill>
                   <a:srgbClr val="000000"/>
                 </a:solidFill>
@@ -245,7 +245,7 @@
               </a:rPr>
               <a:t>Clique para editar o formato de texto dos tópicos</a:t>
             </a:r>
-            <a:endParaRPr b="0" lang="pt-BR" sz="1400" strike="noStrike" u="none">
+            <a:endParaRPr b="0" lang="pt-BR" sz="3200" strike="noStrike" u="none">
               <a:solidFill>
                 <a:srgbClr val="000000"/>
               </a:solidFill>
@@ -267,7 +267,7 @@
               <a:buChar char=""/>
             </a:pPr>
             <a:r>
-              <a:rPr b="0" lang="pt-BR" sz="1400" strike="noStrike" u="none">
+              <a:rPr b="0" lang="pt-BR" sz="2800" strike="noStrike" u="none">
                 <a:solidFill>
                   <a:srgbClr val="000000"/>
                 </a:solidFill>
@@ -277,7 +277,7 @@
               </a:rPr>
               <a:t>2.º nível de tópicos</a:t>
             </a:r>
-            <a:endParaRPr b="0" lang="pt-BR" sz="1400" strike="noStrike" u="none">
+            <a:endParaRPr b="0" lang="pt-BR" sz="2800" strike="noStrike" u="none">
               <a:solidFill>
                 <a:srgbClr val="000000"/>
               </a:solidFill>
@@ -299,7 +299,7 @@
               <a:buChar char=""/>
             </a:pPr>
             <a:r>
-              <a:rPr b="0" lang="pt-BR" sz="1400" strike="noStrike" u="none">
+              <a:rPr b="0" lang="pt-BR" sz="2400" strike="noStrike" u="none">
                 <a:solidFill>
                   <a:srgbClr val="000000"/>
                 </a:solidFill>
@@ -309,7 +309,7 @@
               </a:rPr>
               <a:t>3.º nível de tópicos</a:t>
             </a:r>
-            <a:endParaRPr b="0" lang="pt-BR" sz="1400" strike="noStrike" u="none">
+            <a:endParaRPr b="0" lang="pt-BR" sz="2400" strike="noStrike" u="none">
               <a:solidFill>
                 <a:srgbClr val="000000"/>
               </a:solidFill>
@@ -331,7 +331,7 @@
               <a:buChar char=""/>
             </a:pPr>
             <a:r>
-              <a:rPr b="0" lang="pt-BR" sz="1400" strike="noStrike" u="none">
+              <a:rPr b="0" lang="pt-BR" sz="2000" strike="noStrike" u="none">
                 <a:solidFill>
                   <a:srgbClr val="000000"/>
                 </a:solidFill>
@@ -341,7 +341,7 @@
               </a:rPr>
               <a:t>4.º nível de tópicos</a:t>
             </a:r>
-            <a:endParaRPr b="0" lang="pt-BR" sz="1400" strike="noStrike" u="none">
+            <a:endParaRPr b="0" lang="pt-BR" sz="2000" strike="noStrike" u="none">
               <a:solidFill>
                 <a:srgbClr val="000000"/>
               </a:solidFill>
@@ -482,8 +482,8 @@
         </p:nvSpPr>
         <p:spPr>
           <a:xfrm>
-            <a:off x="0" y="0"/>
-            <a:ext cx="12191760" cy="6857640"/>
+            <a:off x="1080" y="0"/>
+            <a:ext cx="12191040" cy="7396920"/>
           </a:xfrm>
           <a:prstGeom prst="roundRect">
             <a:avLst>
@@ -507,7 +507,7 @@
           <a:fontRef idx="minor"/>
         </p:style>
         <p:txBody>
-          <a:bodyPr anchor="ctr">
+          <a:bodyPr lIns="90000" rIns="90000" tIns="45000" bIns="45000" anchor="ctr">
             <a:noAutofit/>
           </a:bodyPr>
           <a:p>
@@ -539,7 +539,7 @@
         <p:spPr>
           <a:xfrm>
             <a:off x="545400" y="100800"/>
-            <a:ext cx="11536920" cy="6645960"/>
+            <a:ext cx="11536200" cy="6645240"/>
           </a:xfrm>
           <a:prstGeom prst="roundRect">
             <a:avLst>
@@ -563,7 +563,7 @@
           <a:fontRef idx="minor"/>
         </p:style>
         <p:txBody>
-          <a:bodyPr anchor="ctr">
+          <a:bodyPr lIns="90000" rIns="90000" tIns="45000" bIns="45000" anchor="ctr">
             <a:noAutofit/>
           </a:bodyPr>
           <a:p>
@@ -595,7 +595,7 @@
         <p:spPr>
           <a:xfrm>
             <a:off x="703800" y="681480"/>
-            <a:ext cx="1952280" cy="580320"/>
+            <a:ext cx="1951560" cy="579600"/>
           </a:xfrm>
           <a:prstGeom prst="roundRect">
             <a:avLst>
@@ -634,7 +634,7 @@
           <a:fontRef idx="minor"/>
         </p:style>
         <p:txBody>
-          <a:bodyPr anchor="ctr">
+          <a:bodyPr lIns="90000" rIns="90000" tIns="45000" bIns="45000" anchor="ctr">
             <a:noAutofit/>
           </a:bodyPr>
           <a:p>
@@ -657,40 +657,16 @@
           </a:p>
         </p:txBody>
       </p:sp>
-      <p:pic>
-        <p:nvPicPr>
-          <p:cNvPr id="7" name="Google Shape;16;p1" descr=""/>
-          <p:cNvPicPr/>
-          <p:nvPr/>
-        </p:nvPicPr>
-        <p:blipFill>
-          <a:blip r:embed="rId1"/>
-          <a:stretch/>
-        </p:blipFill>
-        <p:spPr>
-          <a:xfrm>
-            <a:off x="-84240" y="5973120"/>
-            <a:ext cx="787680" cy="789480"/>
-          </a:xfrm>
-          <a:prstGeom prst="rect">
-            <a:avLst/>
-          </a:prstGeom>
-          <a:noFill/>
-          <a:ln w="0">
-            <a:noFill/>
-          </a:ln>
-        </p:spPr>
-      </p:pic>
-      <p:sp>
-        <p:nvSpPr>
-          <p:cNvPr id="8" name="Google Shape;17;p1"/>
+      <p:sp>
+        <p:nvSpPr>
+          <p:cNvPr id="7" name="Google Shape;17;p1"/>
           <p:cNvSpPr/>
           <p:nvPr/>
         </p:nvSpPr>
         <p:spPr>
           <a:xfrm>
             <a:off x="2724120" y="681480"/>
-            <a:ext cx="1979640" cy="580320"/>
+            <a:ext cx="1978920" cy="579600"/>
           </a:xfrm>
           <a:prstGeom prst="roundRect">
             <a:avLst>
@@ -729,7 +705,7 @@
           <a:fontRef idx="minor"/>
         </p:style>
         <p:txBody>
-          <a:bodyPr anchor="ctr">
+          <a:bodyPr lIns="90000" rIns="90000" tIns="45000" bIns="45000" anchor="ctr">
             <a:noAutofit/>
           </a:bodyPr>
           <a:p>
@@ -754,14 +730,14 @@
       </p:sp>
       <p:sp>
         <p:nvSpPr>
-          <p:cNvPr id="9" name="Google Shape;18;p1"/>
+          <p:cNvPr id="8" name="Google Shape;18;p1"/>
           <p:cNvSpPr/>
           <p:nvPr/>
         </p:nvSpPr>
         <p:spPr>
           <a:xfrm>
             <a:off x="4790880" y="681480"/>
-            <a:ext cx="1979640" cy="580320"/>
+            <a:ext cx="1978920" cy="579600"/>
           </a:xfrm>
           <a:prstGeom prst="roundRect">
             <a:avLst>
@@ -800,7 +776,7 @@
           <a:fontRef idx="minor"/>
         </p:style>
         <p:txBody>
-          <a:bodyPr anchor="ctr">
+          <a:bodyPr lIns="90000" rIns="90000" tIns="45000" bIns="45000" anchor="ctr">
             <a:noAutofit/>
           </a:bodyPr>
           <a:p>
@@ -825,14 +801,14 @@
       </p:sp>
       <p:sp>
         <p:nvSpPr>
-          <p:cNvPr id="10" name="Google Shape;19;p1"/>
+          <p:cNvPr id="9" name="Google Shape;19;p1"/>
           <p:cNvSpPr/>
           <p:nvPr/>
         </p:nvSpPr>
         <p:spPr>
           <a:xfrm>
             <a:off x="6870600" y="681480"/>
-            <a:ext cx="1892880" cy="580320"/>
+            <a:ext cx="1892160" cy="579600"/>
           </a:xfrm>
           <a:prstGeom prst="roundRect">
             <a:avLst>
@@ -871,7 +847,7 @@
           <a:fontRef idx="minor"/>
         </p:style>
         <p:txBody>
-          <a:bodyPr anchor="ctr">
+          <a:bodyPr lIns="90000" rIns="90000" tIns="45000" bIns="45000" anchor="ctr">
             <a:noAutofit/>
           </a:bodyPr>
           <a:p>
@@ -896,14 +872,14 @@
       </p:sp>
       <p:sp>
         <p:nvSpPr>
-          <p:cNvPr id="11" name="Google Shape;20;p1"/>
+          <p:cNvPr id="10" name="Google Shape;20;p1"/>
           <p:cNvSpPr/>
           <p:nvPr/>
         </p:nvSpPr>
         <p:spPr>
           <a:xfrm>
             <a:off x="703800" y="1362960"/>
-            <a:ext cx="11297880" cy="3299040"/>
+            <a:ext cx="11297160" cy="3298320"/>
           </a:xfrm>
           <a:prstGeom prst="roundRect">
             <a:avLst>
@@ -942,7 +918,7 @@
           <a:fontRef idx="minor"/>
         </p:style>
         <p:txBody>
-          <a:bodyPr anchor="ctr">
+          <a:bodyPr lIns="90000" rIns="90000" tIns="45000" bIns="45000" anchor="ctr">
             <a:noAutofit/>
           </a:bodyPr>
           <a:p>
@@ -967,14 +943,14 @@
       </p:sp>
       <p:sp>
         <p:nvSpPr>
-          <p:cNvPr id="12" name="Google Shape;21;p1"/>
+          <p:cNvPr id="11" name="Google Shape;21;p1"/>
           <p:cNvSpPr/>
           <p:nvPr/>
         </p:nvSpPr>
         <p:spPr>
           <a:xfrm>
             <a:off x="703800" y="4773240"/>
-            <a:ext cx="5567400" cy="1865880"/>
+            <a:ext cx="5566680" cy="1865160"/>
           </a:xfrm>
           <a:prstGeom prst="roundRect">
             <a:avLst>
@@ -1013,7 +989,7 @@
           <a:fontRef idx="minor"/>
         </p:style>
         <p:txBody>
-          <a:bodyPr anchor="ctr">
+          <a:bodyPr lIns="90000" rIns="90000" tIns="45000" bIns="45000" anchor="ctr">
             <a:noAutofit/>
           </a:bodyPr>
           <a:p>
@@ -1038,14 +1014,14 @@
       </p:sp>
       <p:sp>
         <p:nvSpPr>
-          <p:cNvPr id="13" name="Google Shape;22;p1"/>
+          <p:cNvPr id="12" name="Google Shape;22;p1"/>
           <p:cNvSpPr/>
           <p:nvPr/>
         </p:nvSpPr>
         <p:spPr>
           <a:xfrm>
             <a:off x="6355800" y="4773240"/>
-            <a:ext cx="5645880" cy="1865880"/>
+            <a:ext cx="5645160" cy="1865160"/>
           </a:xfrm>
           <a:prstGeom prst="roundRect">
             <a:avLst>
@@ -1084,7 +1060,7 @@
           <a:fontRef idx="minor"/>
         </p:style>
         <p:txBody>
-          <a:bodyPr anchor="ctr">
+          <a:bodyPr lIns="90000" rIns="90000" tIns="45000" bIns="45000" anchor="ctr">
             <a:noAutofit/>
           </a:bodyPr>
           <a:p>
@@ -1109,14 +1085,14 @@
       </p:sp>
       <p:sp>
         <p:nvSpPr>
-          <p:cNvPr id="14" name="Google Shape;23;p1"/>
+          <p:cNvPr id="13" name="Google Shape;23;p1"/>
           <p:cNvSpPr/>
           <p:nvPr/>
         </p:nvSpPr>
         <p:spPr>
           <a:xfrm>
             <a:off x="3269160" y="9360"/>
-            <a:ext cx="6232680" cy="1310040"/>
+            <a:ext cx="6231960" cy="1065240"/>
           </a:xfrm>
           <a:prstGeom prst="rect">
             <a:avLst/>
@@ -1133,7 +1109,7 @@
           <a:fontRef idx="minor"/>
         </p:style>
         <p:txBody>
-          <a:bodyPr anchor="t">
+          <a:bodyPr lIns="90000" rIns="90000" tIns="45000" bIns="45000" anchor="t">
             <a:spAutoFit/>
           </a:bodyPr>
           <a:p>
@@ -1146,7 +1122,7 @@
               </a:tabLst>
             </a:pPr>
             <a:r>
-              <a:rPr b="0" lang="pt-BR" sz="4000" strike="noStrike" u="none">
+              <a:rPr b="0" lang="pt-BR" sz="3200" strike="noStrike" u="none">
                 <a:solidFill>
                   <a:schemeClr val="lt1"/>
                 </a:solidFill>
@@ -1157,27 +1133,27 @@
               </a:rPr>
               <a:t>DASHBOARD DO BRASILEIRÃO</a:t>
             </a:r>
-            <a:endParaRPr b="0" lang="pt-BR" sz="4000" strike="noStrike" u="none">
-              <a:solidFill>
-                <a:srgbClr val="000000"/>
-              </a:solidFill>
-              <a:effectLst/>
-              <a:uFillTx/>
-              <a:latin typeface="Arial"/>
-            </a:endParaRPr>
-          </a:p>
-        </p:txBody>
-      </p:sp>
-      <p:sp>
-        <p:nvSpPr>
-          <p:cNvPr id="15" name="Google Shape;24;p1"/>
+            <a:endParaRPr b="0" lang="pt-BR" sz="3200" strike="noStrike" u="none">
+              <a:solidFill>
+                <a:srgbClr val="000000"/>
+              </a:solidFill>
+              <a:effectLst/>
+              <a:uFillTx/>
+              <a:latin typeface="Arial"/>
+            </a:endParaRPr>
+          </a:p>
+        </p:txBody>
+      </p:sp>
+      <p:sp>
+        <p:nvSpPr>
+          <p:cNvPr id="14" name="Google Shape;24;p1"/>
           <p:cNvSpPr/>
           <p:nvPr/>
         </p:nvSpPr>
         <p:spPr>
           <a:xfrm>
             <a:off x="8851320" y="681480"/>
-            <a:ext cx="1568520" cy="580320"/>
+            <a:ext cx="1567800" cy="579600"/>
           </a:xfrm>
           <a:prstGeom prst="roundRect">
             <a:avLst>
@@ -1205,7 +1181,7 @@
           <a:fontRef idx="minor"/>
         </p:style>
         <p:txBody>
-          <a:bodyPr anchor="ctr">
+          <a:bodyPr lIns="90000" rIns="90000" tIns="45000" bIns="45000" anchor="ctr">
             <a:noAutofit/>
           </a:bodyPr>
           <a:p>
@@ -1230,14 +1206,14 @@
       </p:sp>
       <p:sp>
         <p:nvSpPr>
-          <p:cNvPr id="16" name="Google Shape;25;p1"/>
+          <p:cNvPr id="15" name="Google Shape;25;p1"/>
           <p:cNvSpPr/>
           <p:nvPr/>
         </p:nvSpPr>
         <p:spPr>
           <a:xfrm>
             <a:off x="10500840" y="681480"/>
-            <a:ext cx="1501200" cy="580320"/>
+            <a:ext cx="1500480" cy="579600"/>
           </a:xfrm>
           <a:prstGeom prst="roundRect">
             <a:avLst>
@@ -1265,7 +1241,7 @@
           <a:fontRef idx="minor"/>
         </p:style>
         <p:txBody>
-          <a:bodyPr anchor="ctr">
+          <a:bodyPr lIns="90000" rIns="90000" tIns="45000" bIns="45000" anchor="ctr">
             <a:noAutofit/>
           </a:bodyPr>
           <a:p>

</xml_diff>